<commit_message>
pcep-yang as sent to tarek
</commit_message>
<xml_diff>
--- a/draft-ietf-pce-pcep-yang-02.pptx
+++ b/draft-ietf-pce-pcep-yang-02.pptx
@@ -5,13 +5,17 @@
     <p:sldMasterId id="2147483684" r:id="rId1"/>
   </p:sldMasterIdLst>
   <p:notesMasterIdLst>
-    <p:notesMasterId r:id="rId6"/>
+    <p:notesMasterId r:id="rId10"/>
   </p:notesMasterIdLst>
   <p:sldIdLst>
     <p:sldId id="256" r:id="rId2"/>
     <p:sldId id="257" r:id="rId3"/>
     <p:sldId id="258" r:id="rId4"/>
-    <p:sldId id="259" r:id="rId5"/>
+    <p:sldId id="263" r:id="rId5"/>
+    <p:sldId id="264" r:id="rId6"/>
+    <p:sldId id="260" r:id="rId7"/>
+    <p:sldId id="262" r:id="rId8"/>
+    <p:sldId id="259" r:id="rId9"/>
   </p:sldIdLst>
   <p:sldSz cx="12192000" cy="6858000"/>
   <p:notesSz cx="6858000" cy="9144000"/>
@@ -110,6 +114,11 @@
       </a:defRPr>
     </a:lvl9pPr>
   </p:defaultTextStyle>
+  <p:extLst>
+    <p:ext uri="{EFAFB233-063F-42B5-8137-9DF3F51BA10A}">
+      <p15:sldGuideLst xmlns:p15="http://schemas.microsoft.com/office/powerpoint/2012/main"/>
+    </p:ext>
+  </p:extLst>
 </p:presentation>
 </file>
 
@@ -1843,9 +1852,9 @@
     <dgm:cxn modelId="{4B2E8342-629B-4B0D-8584-95D8DF385BA3}" type="presOf" srcId="{2D40D180-4D71-4AD9-9F76-954B1645C7F4}" destId="{1D7C008E-0E99-411A-AEA6-B253CDEFBC57}" srcOrd="0" destOrd="0" presId="urn:microsoft.com/office/officeart/2008/layout/LinedList"/>
     <dgm:cxn modelId="{D9BCACE6-7F3A-468C-B4CB-248A97F371D1}" type="presOf" srcId="{4F3046AA-789D-4DB2-B040-594D108EDC4B}" destId="{FC927341-CA03-4914-B2A5-710F958FCF6D}" srcOrd="0" destOrd="0" presId="urn:microsoft.com/office/officeart/2008/layout/LinedList"/>
     <dgm:cxn modelId="{FF0399D1-35DD-4022-B388-32DE3BA2C394}" type="presOf" srcId="{E608F08C-3104-4E32-84C4-97F99352C6EE}" destId="{D18A731E-DC66-4CB4-B555-4D73ABC46325}" srcOrd="0" destOrd="0" presId="urn:microsoft.com/office/officeart/2008/layout/LinedList"/>
-    <dgm:cxn modelId="{61D6844C-23E0-45EA-9B1E-DDC30CF8E554}" srcId="{8E35665A-E5F2-4E24-86F5-4DD3A2895F95}" destId="{0219600C-80D0-470C-ADCF-C8EC0F5546F1}" srcOrd="0" destOrd="0" parTransId="{F72C16B0-7423-4DA5-9CA7-57FF7BC1BCEE}" sibTransId="{56B8D415-4694-4D07-A981-80B0E341AA34}"/>
     <dgm:cxn modelId="{4EBE35EB-C720-4F22-A382-2C9B997257DE}" type="presOf" srcId="{1A799360-E857-436C-9D0C-CF68AA6CAE14}" destId="{A3DD8019-8FD8-49B4-9677-CE9E7E6FBA9A}" srcOrd="0" destOrd="0" presId="urn:microsoft.com/office/officeart/2008/layout/LinedList"/>
     <dgm:cxn modelId="{E939A93C-603E-4C5C-8F78-3C16232CF7A1}" type="presOf" srcId="{8E35665A-E5F2-4E24-86F5-4DD3A2895F95}" destId="{08FED5C3-2B3D-40EC-A829-816DB8260D82}" srcOrd="0" destOrd="0" presId="urn:microsoft.com/office/officeart/2008/layout/LinedList"/>
+    <dgm:cxn modelId="{61D6844C-23E0-45EA-9B1E-DDC30CF8E554}" srcId="{8E35665A-E5F2-4E24-86F5-4DD3A2895F95}" destId="{0219600C-80D0-470C-ADCF-C8EC0F5546F1}" srcOrd="0" destOrd="0" parTransId="{F72C16B0-7423-4DA5-9CA7-57FF7BC1BCEE}" sibTransId="{56B8D415-4694-4D07-A981-80B0E341AA34}"/>
     <dgm:cxn modelId="{FFF0B3B5-B0A0-4FE2-8567-BD2D3584C7FF}" srcId="{0219600C-80D0-470C-ADCF-C8EC0F5546F1}" destId="{C2EE3C66-6027-4B68-ACE9-C9119D2A15D6}" srcOrd="1" destOrd="0" parTransId="{D4B29D0C-7EC4-4050-9AFA-79DAFD13EA95}" sibTransId="{20AE6A7E-A57B-48A0-B13E-8A0B1451AA8B}"/>
     <dgm:cxn modelId="{2BA74040-BDD3-4E8D-AFB1-309D738438D7}" srcId="{0219600C-80D0-470C-ADCF-C8EC0F5546F1}" destId="{F757F4D6-0D1D-48EE-A05C-713FCD490D02}" srcOrd="3" destOrd="0" parTransId="{154F2747-E9D8-4C17-97F4-7DE03276659E}" sibTransId="{D2C1F314-D674-4A83-AE28-5A1E767B1541}"/>
     <dgm:cxn modelId="{C9D31729-A6A4-4CB1-87F1-4B8BBD213D5C}" srcId="{4F3046AA-789D-4DB2-B040-594D108EDC4B}" destId="{E608F08C-3104-4E32-84C4-97F99352C6EE}" srcOrd="0" destOrd="0" parTransId="{97B53530-18F1-402F-8EE5-F881A581677E}" sibTransId="{C426D9D4-CF21-4603-A461-FFD569A5EBA0}"/>
@@ -4617,7 +4626,7 @@
           <a:p>
             <a:fld id="{C16E1356-C43E-46FA-9CDA-4B77D90C4E03}" type="datetimeFigureOut">
               <a:rPr lang="en-US" smtClean="0"/>
-              <a:t>3/23/2017</a:t>
+              <a:t>3/29/2017</a:t>
             </a:fld>
             <a:endParaRPr lang="en-US"/>
           </a:p>
@@ -5165,7 +5174,7 @@
           <a:p>
             <a:fld id="{689367D8-AB2F-4DD1-85AD-3D0399E4C05D}" type="datetime1">
               <a:rPr lang="en-US" smtClean="0"/>
-              <a:t>3/23/2017</a:t>
+              <a:t>3/29/2017</a:t>
             </a:fld>
             <a:endParaRPr lang="en-US" dirty="0"/>
           </a:p>
@@ -5385,7 +5394,7 @@
           <a:p>
             <a:fld id="{281232AE-3641-4D87-AC37-D5BF87B77927}" type="datetime1">
               <a:rPr lang="en-US" smtClean="0"/>
-              <a:t>3/23/2017</a:t>
+              <a:t>3/29/2017</a:t>
             </a:fld>
             <a:endParaRPr lang="en-US" dirty="0"/>
           </a:p>
@@ -5564,7 +5573,7 @@
           <a:p>
             <a:fld id="{3686A8A2-1EC4-44CF-81F3-0B7290AEA06B}" type="datetime1">
               <a:rPr lang="en-US" smtClean="0"/>
-              <a:t>3/23/2017</a:t>
+              <a:t>3/29/2017</a:t>
             </a:fld>
             <a:endParaRPr lang="en-US" dirty="0"/>
           </a:p>
@@ -5733,7 +5742,7 @@
           <a:p>
             <a:fld id="{06FC5467-89F0-4177-BBFC-4B4EAB066969}" type="datetime1">
               <a:rPr lang="en-US" smtClean="0"/>
-              <a:t>3/23/2017</a:t>
+              <a:t>3/29/2017</a:t>
             </a:fld>
             <a:endParaRPr lang="en-US" dirty="0"/>
           </a:p>
@@ -5983,7 +5992,7 @@
           <a:p>
             <a:fld id="{FDB46119-26ED-4631-93D6-B40037149707}" type="datetime1">
               <a:rPr lang="en-US" smtClean="0"/>
-              <a:t>3/23/2017</a:t>
+              <a:t>3/29/2017</a:t>
             </a:fld>
             <a:endParaRPr lang="en-US" dirty="0"/>
           </a:p>
@@ -6305,7 +6314,7 @@
           <a:p>
             <a:fld id="{C2A67EA8-E548-4F02-B074-1C9D32E7F619}" type="datetime1">
               <a:rPr lang="en-US" smtClean="0"/>
-              <a:t>3/23/2017</a:t>
+              <a:t>3/29/2017</a:t>
             </a:fld>
             <a:endParaRPr lang="en-US" dirty="0"/>
           </a:p>
@@ -6728,7 +6737,7 @@
           <a:p>
             <a:fld id="{6D7098F6-F273-4777-8317-BDB3970E10FC}" type="datetime1">
               <a:rPr lang="en-US" smtClean="0"/>
-              <a:t>3/23/2017</a:t>
+              <a:t>3/29/2017</a:t>
             </a:fld>
             <a:endParaRPr lang="en-US" dirty="0"/>
           </a:p>
@@ -6845,7 +6854,7 @@
           <a:p>
             <a:fld id="{0C4ACD14-6069-44B5-93E4-6FC4E4B345B1}" type="datetime1">
               <a:rPr lang="en-US" smtClean="0"/>
-              <a:t>3/23/2017</a:t>
+              <a:t>3/29/2017</a:t>
             </a:fld>
             <a:endParaRPr lang="en-US" dirty="0"/>
           </a:p>
@@ -6939,7 +6948,7 @@
           <a:p>
             <a:fld id="{1DD5A14C-9F24-4181-A8F8-E964599B6A4B}" type="datetime1">
               <a:rPr lang="en-US" smtClean="0"/>
-              <a:t>3/23/2017</a:t>
+              <a:t>3/29/2017</a:t>
             </a:fld>
             <a:endParaRPr lang="en-US" dirty="0"/>
           </a:p>
@@ -7228,7 +7237,7 @@
           <a:p>
             <a:fld id="{1EEEBA82-96CC-4005-9ECC-A84CD1418DED}" type="datetime1">
               <a:rPr lang="en-US" smtClean="0"/>
-              <a:t>3/23/2017</a:t>
+              <a:t>3/29/2017</a:t>
             </a:fld>
             <a:endParaRPr lang="en-US" dirty="0"/>
           </a:p>
@@ -7499,7 +7508,7 @@
           <a:p>
             <a:fld id="{81A6E9F9-E5B6-4EDC-A461-4944FB422F87}" type="datetime1">
               <a:rPr lang="en-US" smtClean="0"/>
-              <a:t>3/23/2017</a:t>
+              <a:t>3/29/2017</a:t>
             </a:fld>
             <a:endParaRPr lang="en-US" dirty="0"/>
           </a:p>
@@ -7752,7 +7761,7 @@
           <a:p>
             <a:fld id="{1A1DBBE3-4097-40F2-AA16-E4E8EE79871A}" type="datetime1">
               <a:rPr lang="en-US" smtClean="0"/>
-              <a:t>3/23/2017</a:t>
+              <a:t>3/29/2017</a:t>
             </a:fld>
             <a:endParaRPr lang="en-US" dirty="0"/>
           </a:p>
@@ -8522,7 +8531,9 @@
         </p:nvSpPr>
         <p:spPr/>
         <p:txBody>
-          <a:bodyPr/>
+          <a:bodyPr>
+            <a:normAutofit/>
+          </a:bodyPr>
           <a:lstStyle/>
           <a:p>
             <a:r>
@@ -8573,10 +8584,8 @@
                   </a:schemeClr>
                 </a:solidFill>
               </a:rPr>
-              <a:t>-stats” yang model</a:t>
-            </a:r>
-          </a:p>
-          <a:p>
+              <a:t>-stats</a:t>
+            </a:r>
             <a:r>
               <a:rPr lang="en-US" dirty="0" smtClean="0">
                 <a:solidFill>
@@ -8585,10 +8594,18 @@
                   </a:schemeClr>
                 </a:solidFill>
               </a:rPr>
-              <a:t>The key-chain changes are reflected</a:t>
-            </a:r>
-          </a:p>
-          <a:p>
+              <a:t>” module that augments “</a:t>
+            </a:r>
+            <a:r>
+              <a:rPr lang="en-US" dirty="0" err="1" smtClean="0">
+                <a:solidFill>
+                  <a:schemeClr val="bg1">
+                    <a:lumMod val="50000"/>
+                  </a:schemeClr>
+                </a:solidFill>
+              </a:rPr>
+              <a:t>ietf-pcep</a:t>
+            </a:r>
             <a:r>
               <a:rPr lang="en-US" dirty="0" smtClean="0">
                 <a:solidFill>
@@ -8597,21 +8614,17 @@
                   </a:schemeClr>
                 </a:solidFill>
               </a:rPr>
-              <a:t>Adding TLS</a:t>
-            </a:r>
-          </a:p>
-          <a:p>
-            <a:pPr lvl="1"/>
-            <a:r>
-              <a:rPr lang="en-US" dirty="0">
-                <a:solidFill>
-                  <a:schemeClr val="bg1">
-                    <a:lumMod val="50000"/>
-                  </a:schemeClr>
-                </a:solidFill>
-              </a:rPr>
-              <a:t>D</a:t>
-            </a:r>
+              <a:t>”</a:t>
+            </a:r>
+            <a:endParaRPr lang="en-US" dirty="0" smtClean="0">
+              <a:solidFill>
+                <a:schemeClr val="bg1">
+                  <a:lumMod val="50000"/>
+                </a:schemeClr>
+              </a:solidFill>
+            </a:endParaRPr>
+          </a:p>
+          <a:p>
             <a:r>
               <a:rPr lang="en-US" dirty="0" smtClean="0">
                 <a:solidFill>
@@ -8620,10 +8633,51 @@
                   </a:schemeClr>
                 </a:solidFill>
               </a:rPr>
-              <a:t>iscussion is on-going</a:t>
-            </a:r>
-          </a:p>
-          <a:p>
+              <a:t>Changes in other models</a:t>
+            </a:r>
+          </a:p>
+          <a:p>
+            <a:pPr lvl="1"/>
+            <a:r>
+              <a:rPr lang="en-US" dirty="0" err="1">
+                <a:solidFill>
+                  <a:schemeClr val="bg1">
+                    <a:lumMod val="50000"/>
+                  </a:schemeClr>
+                </a:solidFill>
+              </a:rPr>
+              <a:t>i</a:t>
+            </a:r>
+            <a:r>
+              <a:rPr lang="en-US" dirty="0" err="1" smtClean="0">
+                <a:solidFill>
+                  <a:schemeClr val="bg1">
+                    <a:lumMod val="50000"/>
+                  </a:schemeClr>
+                </a:solidFill>
+              </a:rPr>
+              <a:t>etf-te</a:t>
+            </a:r>
+            <a:endParaRPr lang="en-US" dirty="0" smtClean="0">
+              <a:solidFill>
+                <a:schemeClr val="bg1">
+                  <a:lumMod val="50000"/>
+                </a:schemeClr>
+              </a:solidFill>
+            </a:endParaRPr>
+          </a:p>
+          <a:p>
+            <a:pPr lvl="1"/>
+            <a:r>
+              <a:rPr lang="en-US" dirty="0" err="1" smtClean="0">
+                <a:solidFill>
+                  <a:schemeClr val="bg1">
+                    <a:lumMod val="50000"/>
+                  </a:schemeClr>
+                </a:solidFill>
+              </a:rPr>
+              <a:t>ietf</a:t>
+            </a:r>
             <a:r>
               <a:rPr lang="en-US" dirty="0" smtClean="0">
                 <a:solidFill>
@@ -8632,8 +8686,9 @@
                   </a:schemeClr>
                 </a:solidFill>
               </a:rPr>
-              <a:t>New Grouping from TE</a:t>
-            </a:r>
+              <a:t>-key-chain </a:t>
+            </a:r>
+            <a:endParaRPr lang="en-US" dirty="0"/>
           </a:p>
           <a:p>
             <a:r>
@@ -8644,8 +8699,86 @@
                   </a:schemeClr>
                 </a:solidFill>
               </a:rPr>
-              <a:t>RPC for trigger re-sync</a:t>
-            </a:r>
+              <a:t>Fixed various issues</a:t>
+            </a:r>
+          </a:p>
+          <a:p>
+            <a:pPr lvl="1"/>
+            <a:r>
+              <a:rPr lang="en-US" dirty="0" smtClean="0">
+                <a:solidFill>
+                  <a:schemeClr val="bg1">
+                    <a:lumMod val="50000"/>
+                  </a:schemeClr>
+                </a:solidFill>
+              </a:rPr>
+              <a:t>x-path validation failures</a:t>
+            </a:r>
+          </a:p>
+          <a:p>
+            <a:pPr lvl="1"/>
+            <a:r>
+              <a:rPr lang="en-US" dirty="0" smtClean="0">
+                <a:solidFill>
+                  <a:schemeClr val="bg1">
+                    <a:lumMod val="50000"/>
+                  </a:schemeClr>
+                </a:solidFill>
+              </a:rPr>
+              <a:t>Use of when statement v/s must statement</a:t>
+            </a:r>
+          </a:p>
+          <a:p>
+            <a:r>
+              <a:rPr lang="en-US" dirty="0" smtClean="0">
+                <a:solidFill>
+                  <a:schemeClr val="bg1">
+                    <a:lumMod val="50000"/>
+                  </a:schemeClr>
+                </a:solidFill>
+              </a:rPr>
+              <a:t>RPC </a:t>
+            </a:r>
+            <a:r>
+              <a:rPr lang="en-US" dirty="0" smtClean="0">
+                <a:solidFill>
+                  <a:schemeClr val="bg1">
+                    <a:lumMod val="50000"/>
+                  </a:schemeClr>
+                </a:solidFill>
+              </a:rPr>
+              <a:t>for trigger </a:t>
+            </a:r>
+            <a:r>
+              <a:rPr lang="en-US" dirty="0" smtClean="0">
+                <a:solidFill>
+                  <a:schemeClr val="bg1">
+                    <a:lumMod val="50000"/>
+                  </a:schemeClr>
+                </a:solidFill>
+              </a:rPr>
+              <a:t>re-sync </a:t>
+            </a:r>
+          </a:p>
+          <a:p>
+            <a:pPr lvl="1"/>
+            <a:r>
+              <a:rPr lang="en-US" dirty="0" smtClean="0">
+                <a:solidFill>
+                  <a:schemeClr val="bg1">
+                    <a:lumMod val="50000"/>
+                  </a:schemeClr>
+                </a:solidFill>
+              </a:rPr>
+              <a:t>So that operator can have a mechanism to trigger session re-synchronization </a:t>
+            </a:r>
+            <a:endParaRPr lang="en-US" dirty="0" smtClean="0">
+              <a:solidFill>
+                <a:schemeClr val="bg1">
+                  <a:lumMod val="50000"/>
+                </a:schemeClr>
+              </a:solidFill>
+            </a:endParaRPr>
           </a:p>
           <a:p>
             <a:endParaRPr lang="en-US" dirty="0">
@@ -8736,14 +8869,1250 @@
       </p:grpSpPr>
       <p:sp>
         <p:nvSpPr>
-          <p:cNvPr id="4" name="Rectangle 3"/>
+          <p:cNvPr id="2" name="Title 1"/>
+          <p:cNvSpPr>
+            <a:spLocks noGrp="1"/>
+          </p:cNvSpPr>
+          <p:nvPr>
+            <p:ph type="title"/>
+          </p:nvPr>
+        </p:nvSpPr>
+        <p:spPr/>
+        <p:txBody>
+          <a:bodyPr/>
+          <a:lstStyle/>
+          <a:p>
+            <a:r>
+              <a:rPr lang="en-US" dirty="0" smtClean="0"/>
+              <a:t>Statistics</a:t>
+            </a:r>
+            <a:endParaRPr lang="en-US" dirty="0"/>
+          </a:p>
+        </p:txBody>
+      </p:sp>
+      <p:sp>
+        <p:nvSpPr>
+          <p:cNvPr id="5" name="Footer Placeholder 4"/>
+          <p:cNvSpPr>
+            <a:spLocks noGrp="1"/>
+          </p:cNvSpPr>
+          <p:nvPr>
+            <p:ph type="ftr" sz="quarter" idx="11"/>
+          </p:nvPr>
+        </p:nvSpPr>
+        <p:spPr/>
+        <p:txBody>
+          <a:bodyPr/>
+          <a:lstStyle/>
+          <a:p>
+            <a:r>
+              <a:rPr lang="en-US" smtClean="0"/>
+              <a:t>Joint Yang Session, IETF 98 - Chicago</a:t>
+            </a:r>
+            <a:endParaRPr lang="en-US" dirty="0"/>
+          </a:p>
+        </p:txBody>
+      </p:sp>
+      <p:sp>
+        <p:nvSpPr>
+          <p:cNvPr id="6" name="Slide Number Placeholder 5"/>
+          <p:cNvSpPr>
+            <a:spLocks noGrp="1"/>
+          </p:cNvSpPr>
+          <p:nvPr>
+            <p:ph type="sldNum" sz="quarter" idx="12"/>
+          </p:nvPr>
+        </p:nvSpPr>
+        <p:spPr/>
+        <p:txBody>
+          <a:bodyPr/>
+          <a:lstStyle/>
+          <a:p>
+            <a:fld id="{4FAB73BC-B049-4115-A692-8D63A059BFB8}" type="slidenum">
+              <a:rPr lang="en-US" smtClean="0"/>
+              <a:t>4</a:t>
+            </a:fld>
+            <a:endParaRPr lang="en-US" dirty="0"/>
+          </a:p>
+        </p:txBody>
+      </p:sp>
+      <p:pic>
+        <p:nvPicPr>
+          <p:cNvPr id="7" name="Picture 6"/>
+          <p:cNvPicPr>
+            <a:picLocks noChangeAspect="1"/>
+          </p:cNvPicPr>
+          <p:nvPr/>
+        </p:nvPicPr>
+        <p:blipFill>
+          <a:blip r:embed="rId2"/>
+          <a:stretch>
+            <a:fillRect/>
+          </a:stretch>
+        </p:blipFill>
+        <p:spPr>
+          <a:xfrm>
+            <a:off x="294629" y="1634769"/>
+            <a:ext cx="5467350" cy="4629150"/>
+          </a:xfrm>
+          <a:prstGeom prst="rect">
+            <a:avLst/>
+          </a:prstGeom>
+        </p:spPr>
+      </p:pic>
+      <p:pic>
+        <p:nvPicPr>
+          <p:cNvPr id="8" name="Picture 7"/>
+          <p:cNvPicPr>
+            <a:picLocks noChangeAspect="1"/>
+          </p:cNvPicPr>
+          <p:nvPr/>
+        </p:nvPicPr>
+        <p:blipFill>
+          <a:blip r:embed="rId3"/>
+          <a:stretch>
+            <a:fillRect/>
+          </a:stretch>
+        </p:blipFill>
+        <p:spPr>
+          <a:xfrm>
+            <a:off x="5650179" y="1965960"/>
+            <a:ext cx="6216712" cy="3966768"/>
+          </a:xfrm>
+          <a:prstGeom prst="rect">
+            <a:avLst/>
+          </a:prstGeom>
+        </p:spPr>
+      </p:pic>
+      <p:sp>
+        <p:nvSpPr>
+          <p:cNvPr id="9" name="Rectangle 8"/>
           <p:cNvSpPr/>
           <p:nvPr/>
         </p:nvSpPr>
         <p:spPr>
           <a:xfrm>
-            <a:off x="4356775" y="2967335"/>
-            <a:ext cx="3478453" cy="923330"/>
+            <a:off x="8727362" y="511728"/>
+            <a:ext cx="2910551" cy="932230"/>
+          </a:xfrm>
+          <a:prstGeom prst="rect">
+            <a:avLst/>
+          </a:prstGeom>
+        </p:spPr>
+        <p:style>
+          <a:lnRef idx="2">
+            <a:schemeClr val="accent1">
+              <a:shade val="50000"/>
+            </a:schemeClr>
+          </a:lnRef>
+          <a:fillRef idx="1">
+            <a:schemeClr val="accent1"/>
+          </a:fillRef>
+          <a:effectRef idx="0">
+            <a:schemeClr val="accent1"/>
+          </a:effectRef>
+          <a:fontRef idx="minor">
+            <a:schemeClr val="lt1"/>
+          </a:fontRef>
+        </p:style>
+        <p:txBody>
+          <a:bodyPr rtlCol="0" anchor="ctr"/>
+          <a:lstStyle/>
+          <a:p>
+            <a:pPr algn="ctr"/>
+            <a:r>
+              <a:rPr lang="en-US" dirty="0" smtClean="0"/>
+              <a:t>A separate module that augments </a:t>
+            </a:r>
+            <a:r>
+              <a:rPr lang="en-US" dirty="0" err="1" smtClean="0"/>
+              <a:t>ietf-pcep’s</a:t>
+            </a:r>
+            <a:r>
+              <a:rPr lang="en-US" dirty="0" smtClean="0"/>
+              <a:t> state! </a:t>
+            </a:r>
+            <a:endParaRPr lang="en-US" dirty="0"/>
+          </a:p>
+        </p:txBody>
+      </p:sp>
+    </p:spTree>
+    <p:extLst>
+      <p:ext uri="{BB962C8B-B14F-4D97-AF65-F5344CB8AC3E}">
+        <p14:creationId xmlns:p14="http://schemas.microsoft.com/office/powerpoint/2010/main" val="1590423927"/>
+      </p:ext>
+    </p:extLst>
+  </p:cSld>
+  <p:clrMapOvr>
+    <a:masterClrMapping/>
+  </p:clrMapOvr>
+</p:sld>
+</file>
+
+<file path=ppt/slides/slide5.xml><?xml version="1.0" encoding="utf-8"?>
+<p:sld xmlns:a="http://schemas.openxmlformats.org/drawingml/2006/main" xmlns:r="http://schemas.openxmlformats.org/officeDocument/2006/relationships" xmlns:p="http://schemas.openxmlformats.org/presentationml/2006/main">
+  <p:cSld>
+    <p:spTree>
+      <p:nvGrpSpPr>
+        <p:cNvPr id="1" name=""/>
+        <p:cNvGrpSpPr/>
+        <p:nvPr/>
+      </p:nvGrpSpPr>
+      <p:grpSpPr>
+        <a:xfrm>
+          <a:off x="0" y="0"/>
+          <a:ext cx="0" cy="0"/>
+          <a:chOff x="0" y="0"/>
+          <a:chExt cx="0" cy="0"/>
+        </a:xfrm>
+      </p:grpSpPr>
+      <p:sp>
+        <p:nvSpPr>
+          <p:cNvPr id="2" name="Title 1"/>
+          <p:cNvSpPr>
+            <a:spLocks noGrp="1"/>
+          </p:cNvSpPr>
+          <p:nvPr>
+            <p:ph type="title"/>
+          </p:nvPr>
+        </p:nvSpPr>
+        <p:spPr/>
+        <p:txBody>
+          <a:bodyPr/>
+          <a:lstStyle/>
+          <a:p>
+            <a:r>
+              <a:rPr lang="en-US" dirty="0" smtClean="0"/>
+              <a:t>Grouping Changes </a:t>
+            </a:r>
+            <a:br>
+              <a:rPr lang="en-US" dirty="0" smtClean="0"/>
+            </a:br>
+            <a:r>
+              <a:rPr lang="en-US" dirty="0" smtClean="0"/>
+              <a:t>in other models..</a:t>
+            </a:r>
+            <a:endParaRPr lang="en-US" dirty="0"/>
+          </a:p>
+        </p:txBody>
+      </p:sp>
+      <p:sp>
+        <p:nvSpPr>
+          <p:cNvPr id="4" name="Footer Placeholder 3"/>
+          <p:cNvSpPr>
+            <a:spLocks noGrp="1"/>
+          </p:cNvSpPr>
+          <p:nvPr>
+            <p:ph type="ftr" sz="quarter" idx="11"/>
+          </p:nvPr>
+        </p:nvSpPr>
+        <p:spPr/>
+        <p:txBody>
+          <a:bodyPr/>
+          <a:lstStyle/>
+          <a:p>
+            <a:r>
+              <a:rPr lang="en-US" smtClean="0"/>
+              <a:t>Joint Yang Session, IETF 98 - Chicago</a:t>
+            </a:r>
+            <a:endParaRPr lang="en-US" dirty="0"/>
+          </a:p>
+        </p:txBody>
+      </p:sp>
+      <p:sp>
+        <p:nvSpPr>
+          <p:cNvPr id="5" name="Slide Number Placeholder 4"/>
+          <p:cNvSpPr>
+            <a:spLocks noGrp="1"/>
+          </p:cNvSpPr>
+          <p:nvPr>
+            <p:ph type="sldNum" sz="quarter" idx="12"/>
+          </p:nvPr>
+        </p:nvSpPr>
+        <p:spPr/>
+        <p:txBody>
+          <a:bodyPr/>
+          <a:lstStyle/>
+          <a:p>
+            <a:fld id="{4FAB73BC-B049-4115-A692-8D63A059BFB8}" type="slidenum">
+              <a:rPr lang="en-US" smtClean="0"/>
+              <a:t>5</a:t>
+            </a:fld>
+            <a:endParaRPr lang="en-US" dirty="0"/>
+          </a:p>
+        </p:txBody>
+      </p:sp>
+      <p:pic>
+        <p:nvPicPr>
+          <p:cNvPr id="6" name="Picture 5"/>
+          <p:cNvPicPr>
+            <a:picLocks noChangeAspect="1"/>
+          </p:cNvPicPr>
+          <p:nvPr/>
+        </p:nvPicPr>
+        <p:blipFill>
+          <a:blip r:embed="rId2"/>
+          <a:stretch>
+            <a:fillRect/>
+          </a:stretch>
+        </p:blipFill>
+        <p:spPr>
+          <a:xfrm>
+            <a:off x="451485" y="2680461"/>
+            <a:ext cx="5629275" cy="2895600"/>
+          </a:xfrm>
+          <a:prstGeom prst="rect">
+            <a:avLst/>
+          </a:prstGeom>
+        </p:spPr>
+      </p:pic>
+      <p:pic>
+        <p:nvPicPr>
+          <p:cNvPr id="7" name="Picture 6"/>
+          <p:cNvPicPr>
+            <a:picLocks noChangeAspect="1"/>
+          </p:cNvPicPr>
+          <p:nvPr/>
+        </p:nvPicPr>
+        <p:blipFill>
+          <a:blip r:embed="rId3"/>
+          <a:stretch>
+            <a:fillRect/>
+          </a:stretch>
+        </p:blipFill>
+        <p:spPr>
+          <a:xfrm>
+            <a:off x="6308035" y="906473"/>
+            <a:ext cx="5371892" cy="5317355"/>
+          </a:xfrm>
+          <a:prstGeom prst="rect">
+            <a:avLst/>
+          </a:prstGeom>
+        </p:spPr>
+      </p:pic>
+    </p:spTree>
+    <p:extLst>
+      <p:ext uri="{BB962C8B-B14F-4D97-AF65-F5344CB8AC3E}">
+        <p14:creationId xmlns:p14="http://schemas.microsoft.com/office/powerpoint/2010/main" val="144987031"/>
+      </p:ext>
+    </p:extLst>
+  </p:cSld>
+  <p:clrMapOvr>
+    <a:masterClrMapping/>
+  </p:clrMapOvr>
+</p:sld>
+</file>
+
+<file path=ppt/slides/slide6.xml><?xml version="1.0" encoding="utf-8"?>
+<p:sld xmlns:a="http://schemas.openxmlformats.org/drawingml/2006/main" xmlns:r="http://schemas.openxmlformats.org/officeDocument/2006/relationships" xmlns:p="http://schemas.openxmlformats.org/presentationml/2006/main">
+  <p:cSld>
+    <p:spTree>
+      <p:nvGrpSpPr>
+        <p:cNvPr id="1" name=""/>
+        <p:cNvGrpSpPr/>
+        <p:nvPr/>
+      </p:nvGrpSpPr>
+      <p:grpSpPr>
+        <a:xfrm>
+          <a:off x="0" y="0"/>
+          <a:ext cx="0" cy="0"/>
+          <a:chOff x="0" y="0"/>
+          <a:chExt cx="0" cy="0"/>
+        </a:xfrm>
+      </p:grpSpPr>
+      <p:sp>
+        <p:nvSpPr>
+          <p:cNvPr id="2" name="Title 1"/>
+          <p:cNvSpPr>
+            <a:spLocks noGrp="1"/>
+          </p:cNvSpPr>
+          <p:nvPr>
+            <p:ph type="title"/>
+          </p:nvPr>
+        </p:nvSpPr>
+        <p:spPr/>
+        <p:txBody>
+          <a:bodyPr/>
+          <a:lstStyle/>
+          <a:p>
+            <a:r>
+              <a:rPr lang="en-US" dirty="0" smtClean="0"/>
+              <a:t>Questions.. </a:t>
+            </a:r>
+            <a:endParaRPr lang="en-US" dirty="0"/>
+          </a:p>
+        </p:txBody>
+      </p:sp>
+      <p:sp>
+        <p:nvSpPr>
+          <p:cNvPr id="4" name="Footer Placeholder 3"/>
+          <p:cNvSpPr>
+            <a:spLocks noGrp="1"/>
+          </p:cNvSpPr>
+          <p:nvPr>
+            <p:ph type="ftr" sz="quarter" idx="11"/>
+          </p:nvPr>
+        </p:nvSpPr>
+        <p:spPr/>
+        <p:txBody>
+          <a:bodyPr/>
+          <a:lstStyle/>
+          <a:p>
+            <a:r>
+              <a:rPr lang="en-US" smtClean="0"/>
+              <a:t>Joint Yang Session, IETF 98 - Chicago</a:t>
+            </a:r>
+            <a:endParaRPr lang="en-US" dirty="0"/>
+          </a:p>
+        </p:txBody>
+      </p:sp>
+      <p:sp>
+        <p:nvSpPr>
+          <p:cNvPr id="5" name="Slide Number Placeholder 4"/>
+          <p:cNvSpPr>
+            <a:spLocks noGrp="1"/>
+          </p:cNvSpPr>
+          <p:nvPr>
+            <p:ph type="sldNum" sz="quarter" idx="12"/>
+          </p:nvPr>
+        </p:nvSpPr>
+        <p:spPr/>
+        <p:txBody>
+          <a:bodyPr/>
+          <a:lstStyle/>
+          <a:p>
+            <a:fld id="{4FAB73BC-B049-4115-A692-8D63A059BFB8}" type="slidenum">
+              <a:rPr lang="en-US" smtClean="0"/>
+              <a:t>6</a:t>
+            </a:fld>
+            <a:endParaRPr lang="en-US" dirty="0"/>
+          </a:p>
+        </p:txBody>
+      </p:sp>
+      <p:sp>
+        <p:nvSpPr>
+          <p:cNvPr id="6" name="Content Placeholder 2"/>
+          <p:cNvSpPr txBox="1">
+            <a:spLocks/>
+          </p:cNvSpPr>
+          <p:nvPr/>
+        </p:nvSpPr>
+        <p:spPr>
+          <a:xfrm>
+            <a:off x="1162876" y="2075594"/>
+            <a:ext cx="9872871" cy="4038600"/>
+          </a:xfrm>
+          <a:prstGeom prst="rect">
+            <a:avLst/>
+          </a:prstGeom>
+        </p:spPr>
+        <p:txBody>
+          <a:bodyPr vert="horz" lIns="91440" tIns="45720" rIns="91440" bIns="45720" rtlCol="0">
+            <a:normAutofit/>
+          </a:bodyPr>
+          <a:lstStyle>
+            <a:lvl1pPr marL="228600" indent="-182880" algn="l" defTabSz="914400" rtl="0" eaLnBrk="1" latinLnBrk="0" hangingPunct="1">
+              <a:lnSpc>
+                <a:spcPct val="90000"/>
+              </a:lnSpc>
+              <a:spcBef>
+                <a:spcPts val="1400"/>
+              </a:spcBef>
+              <a:buClr>
+                <a:schemeClr val="accent1"/>
+              </a:buClr>
+              <a:buSzPct val="80000"/>
+              <a:buFont typeface="Corbel" pitchFamily="34" charset="0"/>
+              <a:buChar char="•"/>
+              <a:defRPr sz="2200" kern="1200">
+                <a:solidFill>
+                  <a:schemeClr val="accent1"/>
+                </a:solidFill>
+                <a:latin typeface="+mn-lt"/>
+                <a:ea typeface="+mn-ea"/>
+                <a:cs typeface="+mn-cs"/>
+              </a:defRPr>
+            </a:lvl1pPr>
+            <a:lvl2pPr marL="457200" indent="-182880" algn="l" defTabSz="914400" rtl="0" eaLnBrk="1" latinLnBrk="0" hangingPunct="1">
+              <a:lnSpc>
+                <a:spcPct val="90000"/>
+              </a:lnSpc>
+              <a:spcBef>
+                <a:spcPts val="200"/>
+              </a:spcBef>
+              <a:spcAft>
+                <a:spcPts val="400"/>
+              </a:spcAft>
+              <a:buClr>
+                <a:schemeClr val="accent1"/>
+              </a:buClr>
+              <a:buSzPct val="80000"/>
+              <a:buFont typeface="Corbel" pitchFamily="34" charset="0"/>
+              <a:buChar char="•"/>
+              <a:defRPr sz="2000" kern="1200">
+                <a:solidFill>
+                  <a:schemeClr val="accent1"/>
+                </a:solidFill>
+                <a:latin typeface="+mn-lt"/>
+                <a:ea typeface="+mn-ea"/>
+                <a:cs typeface="+mn-cs"/>
+              </a:defRPr>
+            </a:lvl2pPr>
+            <a:lvl3pPr marL="731520" indent="-182880" algn="l" defTabSz="914400" rtl="0" eaLnBrk="1" latinLnBrk="0" hangingPunct="1">
+              <a:lnSpc>
+                <a:spcPct val="90000"/>
+              </a:lnSpc>
+              <a:spcBef>
+                <a:spcPts val="200"/>
+              </a:spcBef>
+              <a:spcAft>
+                <a:spcPts val="400"/>
+              </a:spcAft>
+              <a:buClr>
+                <a:schemeClr val="accent1"/>
+              </a:buClr>
+              <a:buSzPct val="80000"/>
+              <a:buFont typeface="Corbel" pitchFamily="34" charset="0"/>
+              <a:buChar char="•"/>
+              <a:defRPr sz="1800" kern="1200">
+                <a:solidFill>
+                  <a:schemeClr val="accent1"/>
+                </a:solidFill>
+                <a:latin typeface="+mn-lt"/>
+                <a:ea typeface="+mn-ea"/>
+                <a:cs typeface="+mn-cs"/>
+              </a:defRPr>
+            </a:lvl3pPr>
+            <a:lvl4pPr marL="1005840" indent="-182880" algn="l" defTabSz="914400" rtl="0" eaLnBrk="1" latinLnBrk="0" hangingPunct="1">
+              <a:lnSpc>
+                <a:spcPct val="90000"/>
+              </a:lnSpc>
+              <a:spcBef>
+                <a:spcPts val="200"/>
+              </a:spcBef>
+              <a:spcAft>
+                <a:spcPts val="400"/>
+              </a:spcAft>
+              <a:buClr>
+                <a:schemeClr val="accent1"/>
+              </a:buClr>
+              <a:buSzPct val="80000"/>
+              <a:buFont typeface="Corbel" pitchFamily="34" charset="0"/>
+              <a:buChar char="•"/>
+              <a:defRPr sz="1600" kern="1200">
+                <a:solidFill>
+                  <a:schemeClr val="accent1"/>
+                </a:solidFill>
+                <a:latin typeface="+mn-lt"/>
+                <a:ea typeface="+mn-ea"/>
+                <a:cs typeface="+mn-cs"/>
+              </a:defRPr>
+            </a:lvl4pPr>
+            <a:lvl5pPr marL="1280160" indent="-182880" algn="l" defTabSz="914400" rtl="0" eaLnBrk="1" latinLnBrk="0" hangingPunct="1">
+              <a:lnSpc>
+                <a:spcPct val="90000"/>
+              </a:lnSpc>
+              <a:spcBef>
+                <a:spcPts val="200"/>
+              </a:spcBef>
+              <a:spcAft>
+                <a:spcPts val="400"/>
+              </a:spcAft>
+              <a:buClr>
+                <a:schemeClr val="accent1"/>
+              </a:buClr>
+              <a:buSzPct val="80000"/>
+              <a:buFont typeface="Corbel" pitchFamily="34" charset="0"/>
+              <a:buChar char="•"/>
+              <a:defRPr sz="1600" kern="1200">
+                <a:solidFill>
+                  <a:schemeClr val="accent1"/>
+                </a:solidFill>
+                <a:latin typeface="+mn-lt"/>
+                <a:ea typeface="+mn-ea"/>
+                <a:cs typeface="+mn-cs"/>
+              </a:defRPr>
+            </a:lvl5pPr>
+            <a:lvl6pPr marL="1600000" indent="-228600" algn="l" defTabSz="914400" rtl="0" eaLnBrk="1" latinLnBrk="0" hangingPunct="1">
+              <a:lnSpc>
+                <a:spcPct val="90000"/>
+              </a:lnSpc>
+              <a:spcBef>
+                <a:spcPts val="200"/>
+              </a:spcBef>
+              <a:spcAft>
+                <a:spcPts val="400"/>
+              </a:spcAft>
+              <a:buClr>
+                <a:schemeClr val="accent1"/>
+              </a:buClr>
+              <a:buSzPct val="80000"/>
+              <a:buFont typeface="Corbel" pitchFamily="34" charset="0"/>
+              <a:buChar char="•"/>
+              <a:defRPr sz="1600" kern="1200">
+                <a:solidFill>
+                  <a:schemeClr val="accent1"/>
+                </a:solidFill>
+                <a:latin typeface="+mn-lt"/>
+                <a:ea typeface="+mn-ea"/>
+                <a:cs typeface="+mn-cs"/>
+              </a:defRPr>
+            </a:lvl6pPr>
+            <a:lvl7pPr marL="1900000" indent="-228600" algn="l" defTabSz="914400" rtl="0" eaLnBrk="1" latinLnBrk="0" hangingPunct="1">
+              <a:lnSpc>
+                <a:spcPct val="90000"/>
+              </a:lnSpc>
+              <a:spcBef>
+                <a:spcPts val="200"/>
+              </a:spcBef>
+              <a:spcAft>
+                <a:spcPts val="400"/>
+              </a:spcAft>
+              <a:buClr>
+                <a:schemeClr val="accent1"/>
+              </a:buClr>
+              <a:buSzPct val="80000"/>
+              <a:buFont typeface="Corbel" pitchFamily="34" charset="0"/>
+              <a:buChar char="•"/>
+              <a:defRPr sz="1600" kern="1200">
+                <a:solidFill>
+                  <a:schemeClr val="accent1"/>
+                </a:solidFill>
+                <a:latin typeface="+mn-lt"/>
+                <a:ea typeface="+mn-ea"/>
+                <a:cs typeface="+mn-cs"/>
+              </a:defRPr>
+            </a:lvl7pPr>
+            <a:lvl8pPr marL="2200000" indent="-228600" algn="l" defTabSz="914400" rtl="0" eaLnBrk="1" latinLnBrk="0" hangingPunct="1">
+              <a:lnSpc>
+                <a:spcPct val="90000"/>
+              </a:lnSpc>
+              <a:spcBef>
+                <a:spcPts val="200"/>
+              </a:spcBef>
+              <a:spcAft>
+                <a:spcPts val="400"/>
+              </a:spcAft>
+              <a:buClr>
+                <a:schemeClr val="accent1"/>
+              </a:buClr>
+              <a:buSzPct val="80000"/>
+              <a:buFont typeface="Corbel" pitchFamily="34" charset="0"/>
+              <a:buChar char="•"/>
+              <a:defRPr sz="1600" kern="1200">
+                <a:solidFill>
+                  <a:schemeClr val="accent1"/>
+                </a:solidFill>
+                <a:latin typeface="+mn-lt"/>
+                <a:ea typeface="+mn-ea"/>
+                <a:cs typeface="+mn-cs"/>
+              </a:defRPr>
+            </a:lvl8pPr>
+            <a:lvl9pPr marL="2500000" indent="-228600" algn="l" defTabSz="914400" rtl="0" eaLnBrk="1" latinLnBrk="0" hangingPunct="1">
+              <a:lnSpc>
+                <a:spcPct val="90000"/>
+              </a:lnSpc>
+              <a:spcBef>
+                <a:spcPts val="200"/>
+              </a:spcBef>
+              <a:spcAft>
+                <a:spcPts val="400"/>
+              </a:spcAft>
+              <a:buClr>
+                <a:schemeClr val="accent1"/>
+              </a:buClr>
+              <a:buSzPct val="80000"/>
+              <a:buFont typeface="Corbel" pitchFamily="34" charset="0"/>
+              <a:buChar char="•"/>
+              <a:defRPr sz="1600" kern="1200">
+                <a:solidFill>
+                  <a:schemeClr val="accent1"/>
+                </a:solidFill>
+                <a:latin typeface="+mn-lt"/>
+                <a:ea typeface="+mn-ea"/>
+                <a:cs typeface="+mn-cs"/>
+              </a:defRPr>
+            </a:lvl9pPr>
+          </a:lstStyle>
+          <a:p>
+            <a:r>
+              <a:rPr lang="en-US" dirty="0" smtClean="0">
+                <a:solidFill>
+                  <a:schemeClr val="bg1">
+                    <a:lumMod val="50000"/>
+                  </a:schemeClr>
+                </a:solidFill>
+              </a:rPr>
+              <a:t>Model</a:t>
+            </a:r>
+          </a:p>
+          <a:p>
+            <a:pPr lvl="1"/>
+            <a:r>
+              <a:rPr lang="en-US" dirty="0" smtClean="0">
+                <a:solidFill>
+                  <a:schemeClr val="bg1">
+                    <a:lumMod val="50000"/>
+                  </a:schemeClr>
+                </a:solidFill>
+              </a:rPr>
+              <a:t>The </a:t>
+            </a:r>
+            <a:r>
+              <a:rPr lang="en-US" dirty="0" err="1" smtClean="0">
+                <a:solidFill>
+                  <a:schemeClr val="bg1">
+                    <a:lumMod val="50000"/>
+                  </a:schemeClr>
+                </a:solidFill>
+              </a:rPr>
+              <a:t>pcep</a:t>
+            </a:r>
+            <a:r>
+              <a:rPr lang="en-US" dirty="0" smtClean="0">
+                <a:solidFill>
+                  <a:schemeClr val="bg1">
+                    <a:lumMod val="50000"/>
+                  </a:schemeClr>
+                </a:solidFill>
+              </a:rPr>
+              <a:t> model has ‘</a:t>
+            </a:r>
+            <a:r>
+              <a:rPr lang="en-US" dirty="0" err="1" smtClean="0">
+                <a:solidFill>
+                  <a:schemeClr val="bg1">
+                    <a:lumMod val="50000"/>
+                  </a:schemeClr>
+                </a:solidFill>
+              </a:rPr>
+              <a:t>config</a:t>
+            </a:r>
+            <a:r>
+              <a:rPr lang="en-US" dirty="0" smtClean="0">
+                <a:solidFill>
+                  <a:schemeClr val="bg1">
+                    <a:lumMod val="50000"/>
+                  </a:schemeClr>
+                </a:solidFill>
+              </a:rPr>
+              <a:t>’ &amp; ‘state’ constrainers separated from the inception.</a:t>
+            </a:r>
+          </a:p>
+          <a:p>
+            <a:pPr lvl="1"/>
+            <a:r>
+              <a:rPr lang="en-US" dirty="0" smtClean="0">
+                <a:solidFill>
+                  <a:schemeClr val="bg1">
+                    <a:lumMod val="50000"/>
+                  </a:schemeClr>
+                </a:solidFill>
+              </a:rPr>
+              <a:t>We *prefer* to keep it that way! </a:t>
+            </a:r>
+          </a:p>
+          <a:p>
+            <a:pPr lvl="2"/>
+            <a:r>
+              <a:rPr lang="en-US" dirty="0">
+                <a:solidFill>
+                  <a:schemeClr val="bg1">
+                    <a:lumMod val="50000"/>
+                  </a:schemeClr>
+                </a:solidFill>
+              </a:rPr>
+              <a:t>A</a:t>
+            </a:r>
+            <a:r>
+              <a:rPr lang="en-US" dirty="0" smtClean="0">
+                <a:solidFill>
+                  <a:schemeClr val="bg1">
+                    <a:lumMod val="50000"/>
+                  </a:schemeClr>
+                </a:solidFill>
+              </a:rPr>
+              <a:t>re there any motivations to change that? </a:t>
+            </a:r>
+          </a:p>
+          <a:p>
+            <a:pPr lvl="2"/>
+            <a:r>
+              <a:rPr lang="en-US" dirty="0" smtClean="0">
+                <a:solidFill>
+                  <a:schemeClr val="bg1">
+                    <a:lumMod val="50000"/>
+                  </a:schemeClr>
+                </a:solidFill>
+              </a:rPr>
+              <a:t>What is the impact when revised-data-store is ready? </a:t>
+            </a:r>
+          </a:p>
+          <a:p>
+            <a:r>
+              <a:rPr lang="en-US" dirty="0" smtClean="0">
+                <a:solidFill>
+                  <a:schemeClr val="bg1">
+                    <a:lumMod val="50000"/>
+                  </a:schemeClr>
+                </a:solidFill>
+              </a:rPr>
+              <a:t>Notifications</a:t>
+            </a:r>
+          </a:p>
+          <a:p>
+            <a:pPr lvl="1"/>
+            <a:r>
+              <a:rPr lang="en-US" dirty="0" smtClean="0">
+                <a:solidFill>
+                  <a:schemeClr val="bg1">
+                    <a:lumMod val="50000"/>
+                  </a:schemeClr>
+                </a:solidFill>
+              </a:rPr>
+              <a:t>Draft has some notifications related to PCEP session up/down or overload. </a:t>
+            </a:r>
+          </a:p>
+          <a:p>
+            <a:pPr lvl="1"/>
+            <a:r>
+              <a:rPr lang="en-US" dirty="0" smtClean="0">
+                <a:solidFill>
+                  <a:schemeClr val="bg1">
+                    <a:lumMod val="50000"/>
+                  </a:schemeClr>
+                </a:solidFill>
+              </a:rPr>
+              <a:t>We prefer to keep them!</a:t>
+            </a:r>
+          </a:p>
+          <a:p>
+            <a:pPr lvl="2"/>
+            <a:r>
+              <a:rPr lang="en-US" dirty="0" smtClean="0">
+                <a:solidFill>
+                  <a:schemeClr val="bg1">
+                    <a:lumMod val="50000"/>
+                  </a:schemeClr>
+                </a:solidFill>
+              </a:rPr>
+              <a:t>Are there motivations to remove even the most basic ‘notifications’ from the model?  </a:t>
+            </a:r>
+          </a:p>
+          <a:p>
+            <a:pPr marL="274320" lvl="1" indent="0">
+              <a:buNone/>
+            </a:pPr>
+            <a:r>
+              <a:rPr lang="en-US" dirty="0" smtClean="0">
+                <a:solidFill>
+                  <a:schemeClr val="bg1">
+                    <a:lumMod val="50000"/>
+                  </a:schemeClr>
+                </a:solidFill>
+              </a:rPr>
+              <a:t> </a:t>
+            </a:r>
+          </a:p>
+          <a:p>
+            <a:pPr marL="274320" lvl="1" indent="0">
+              <a:buNone/>
+            </a:pPr>
+            <a:r>
+              <a:rPr lang="en-US" dirty="0">
+                <a:solidFill>
+                  <a:schemeClr val="bg1">
+                    <a:lumMod val="50000"/>
+                  </a:schemeClr>
+                </a:solidFill>
+              </a:rPr>
+              <a:t>	</a:t>
+            </a:r>
+            <a:endParaRPr lang="en-US" dirty="0" smtClean="0">
+              <a:solidFill>
+                <a:schemeClr val="bg1">
+                  <a:lumMod val="50000"/>
+                </a:schemeClr>
+              </a:solidFill>
+            </a:endParaRPr>
+          </a:p>
+        </p:txBody>
+      </p:sp>
+    </p:spTree>
+    <p:extLst>
+      <p:ext uri="{BB962C8B-B14F-4D97-AF65-F5344CB8AC3E}">
+        <p14:creationId xmlns:p14="http://schemas.microsoft.com/office/powerpoint/2010/main" val="2059973283"/>
+      </p:ext>
+    </p:extLst>
+  </p:cSld>
+  <p:clrMapOvr>
+    <a:masterClrMapping/>
+  </p:clrMapOvr>
+</p:sld>
+</file>
+
+<file path=ppt/slides/slide7.xml><?xml version="1.0" encoding="utf-8"?>
+<p:sld xmlns:a="http://schemas.openxmlformats.org/drawingml/2006/main" xmlns:r="http://schemas.openxmlformats.org/officeDocument/2006/relationships" xmlns:p="http://schemas.openxmlformats.org/presentationml/2006/main">
+  <p:cSld>
+    <p:spTree>
+      <p:nvGrpSpPr>
+        <p:cNvPr id="1" name=""/>
+        <p:cNvGrpSpPr/>
+        <p:nvPr/>
+      </p:nvGrpSpPr>
+      <p:grpSpPr>
+        <a:xfrm>
+          <a:off x="0" y="0"/>
+          <a:ext cx="0" cy="0"/>
+          <a:chOff x="0" y="0"/>
+          <a:chExt cx="0" cy="0"/>
+        </a:xfrm>
+      </p:grpSpPr>
+      <p:sp>
+        <p:nvSpPr>
+          <p:cNvPr id="2" name="Title 1"/>
+          <p:cNvSpPr>
+            <a:spLocks noGrp="1"/>
+          </p:cNvSpPr>
+          <p:nvPr>
+            <p:ph type="title"/>
+          </p:nvPr>
+        </p:nvSpPr>
+        <p:spPr/>
+        <p:txBody>
+          <a:bodyPr/>
+          <a:lstStyle/>
+          <a:p>
+            <a:r>
+              <a:rPr lang="en-US" dirty="0" smtClean="0"/>
+              <a:t>To Do</a:t>
+            </a:r>
+            <a:endParaRPr lang="en-US" dirty="0"/>
+          </a:p>
+        </p:txBody>
+      </p:sp>
+      <p:sp>
+        <p:nvSpPr>
+          <p:cNvPr id="3" name="Content Placeholder 2"/>
+          <p:cNvSpPr>
+            <a:spLocks noGrp="1"/>
+          </p:cNvSpPr>
+          <p:nvPr>
+            <p:ph idx="1"/>
+          </p:nvPr>
+        </p:nvSpPr>
+        <p:spPr/>
+        <p:txBody>
+          <a:bodyPr/>
+          <a:lstStyle/>
+          <a:p>
+            <a:r>
+              <a:rPr lang="en-US" dirty="0">
+                <a:solidFill>
+                  <a:schemeClr val="bg1">
+                    <a:lumMod val="50000"/>
+                  </a:schemeClr>
+                </a:solidFill>
+              </a:rPr>
+              <a:t>Adding TLS </a:t>
+            </a:r>
+            <a:r>
+              <a:rPr lang="en-US" dirty="0" smtClean="0">
+                <a:solidFill>
+                  <a:schemeClr val="bg1">
+                    <a:lumMod val="50000"/>
+                  </a:schemeClr>
+                </a:solidFill>
+              </a:rPr>
+              <a:t>support for PCEPS</a:t>
+            </a:r>
+            <a:endParaRPr lang="en-US" dirty="0">
+              <a:solidFill>
+                <a:schemeClr val="bg1">
+                  <a:lumMod val="50000"/>
+                </a:schemeClr>
+              </a:solidFill>
+            </a:endParaRPr>
+          </a:p>
+          <a:p>
+            <a:pPr lvl="1"/>
+            <a:r>
+              <a:rPr lang="en-US" dirty="0">
+                <a:solidFill>
+                  <a:schemeClr val="bg1">
+                    <a:lumMod val="50000"/>
+                  </a:schemeClr>
+                </a:solidFill>
+              </a:rPr>
+              <a:t>Discussion is on-going with </a:t>
+            </a:r>
+            <a:r>
+              <a:rPr lang="en-US" dirty="0" err="1">
+                <a:solidFill>
+                  <a:schemeClr val="bg1">
+                    <a:lumMod val="50000"/>
+                  </a:schemeClr>
+                </a:solidFill>
+              </a:rPr>
+              <a:t>netconf</a:t>
+            </a:r>
+            <a:r>
+              <a:rPr lang="en-US" dirty="0">
+                <a:solidFill>
+                  <a:schemeClr val="bg1">
+                    <a:lumMod val="50000"/>
+                  </a:schemeClr>
+                </a:solidFill>
+              </a:rPr>
+              <a:t> </a:t>
+            </a:r>
+            <a:r>
+              <a:rPr lang="en-US" dirty="0" smtClean="0">
+                <a:solidFill>
+                  <a:schemeClr val="bg1">
+                    <a:lumMod val="50000"/>
+                  </a:schemeClr>
+                </a:solidFill>
+              </a:rPr>
+              <a:t>authors of –</a:t>
+            </a:r>
+          </a:p>
+          <a:p>
+            <a:pPr lvl="2"/>
+            <a:r>
+              <a:rPr lang="en-US" dirty="0" err="1">
+                <a:solidFill>
+                  <a:schemeClr val="bg1">
+                    <a:lumMod val="50000"/>
+                  </a:schemeClr>
+                </a:solidFill>
+              </a:rPr>
+              <a:t>ietf</a:t>
+            </a:r>
+            <a:r>
+              <a:rPr lang="en-US" dirty="0">
+                <a:solidFill>
+                  <a:schemeClr val="bg1">
+                    <a:lumMod val="50000"/>
+                  </a:schemeClr>
+                </a:solidFill>
+              </a:rPr>
+              <a:t>-</a:t>
+            </a:r>
+            <a:r>
+              <a:rPr lang="en-US" dirty="0" err="1">
+                <a:solidFill>
+                  <a:schemeClr val="bg1">
+                    <a:lumMod val="50000"/>
+                  </a:schemeClr>
+                </a:solidFill>
+              </a:rPr>
+              <a:t>tls</a:t>
+            </a:r>
+            <a:r>
+              <a:rPr lang="en-US" dirty="0">
+                <a:solidFill>
+                  <a:schemeClr val="bg1">
+                    <a:lumMod val="50000"/>
+                  </a:schemeClr>
+                </a:solidFill>
+              </a:rPr>
+              <a:t>-client</a:t>
+            </a:r>
+          </a:p>
+          <a:p>
+            <a:pPr lvl="2"/>
+            <a:r>
+              <a:rPr lang="en-US" dirty="0" err="1" smtClean="0">
+                <a:solidFill>
+                  <a:schemeClr val="bg1">
+                    <a:lumMod val="50000"/>
+                  </a:schemeClr>
+                </a:solidFill>
+              </a:rPr>
+              <a:t>ietf</a:t>
+            </a:r>
+            <a:r>
+              <a:rPr lang="en-US" dirty="0" smtClean="0">
+                <a:solidFill>
+                  <a:schemeClr val="bg1">
+                    <a:lumMod val="50000"/>
+                  </a:schemeClr>
+                </a:solidFill>
+              </a:rPr>
+              <a:t>-</a:t>
+            </a:r>
+            <a:r>
+              <a:rPr lang="en-US" dirty="0" err="1" smtClean="0">
+                <a:solidFill>
+                  <a:schemeClr val="bg1">
+                    <a:lumMod val="50000"/>
+                  </a:schemeClr>
+                </a:solidFill>
+              </a:rPr>
+              <a:t>tls</a:t>
+            </a:r>
+            <a:r>
+              <a:rPr lang="en-US" dirty="0" smtClean="0">
+                <a:solidFill>
+                  <a:schemeClr val="bg1">
+                    <a:lumMod val="50000"/>
+                  </a:schemeClr>
+                </a:solidFill>
+              </a:rPr>
+              <a:t>-server</a:t>
+            </a:r>
+          </a:p>
+          <a:p>
+            <a:pPr lvl="2"/>
+            <a:r>
+              <a:rPr lang="en-US" dirty="0" smtClean="0">
+                <a:solidFill>
+                  <a:schemeClr val="bg1">
+                    <a:lumMod val="50000"/>
+                  </a:schemeClr>
+                </a:solidFill>
+              </a:rPr>
+              <a:t>Which were updated recently! </a:t>
+            </a:r>
+          </a:p>
+          <a:p>
+            <a:pPr lvl="1"/>
+            <a:r>
+              <a:rPr lang="en-US" dirty="0" smtClean="0">
+                <a:solidFill>
+                  <a:schemeClr val="bg1">
+                    <a:lumMod val="50000"/>
+                  </a:schemeClr>
+                </a:solidFill>
+              </a:rPr>
+              <a:t>We would be using the groupings defined in these model.</a:t>
+            </a:r>
+          </a:p>
+          <a:p>
+            <a:pPr lvl="1"/>
+            <a:endParaRPr lang="en-US" dirty="0">
+              <a:solidFill>
+                <a:schemeClr val="bg1">
+                  <a:lumMod val="50000"/>
+                </a:schemeClr>
+              </a:solidFill>
+            </a:endParaRPr>
+          </a:p>
+          <a:p>
+            <a:pPr lvl="1"/>
+            <a:r>
+              <a:rPr lang="en-US" dirty="0" smtClean="0">
+                <a:solidFill>
+                  <a:schemeClr val="bg1">
+                    <a:lumMod val="50000"/>
+                  </a:schemeClr>
+                </a:solidFill>
+              </a:rPr>
+              <a:t>Plan to put an update out SOON. </a:t>
+            </a:r>
+          </a:p>
+          <a:p>
+            <a:pPr lvl="1"/>
+            <a:endParaRPr lang="en-US" dirty="0" smtClean="0">
+              <a:solidFill>
+                <a:schemeClr val="bg1">
+                  <a:lumMod val="50000"/>
+                </a:schemeClr>
+              </a:solidFill>
+            </a:endParaRPr>
+          </a:p>
+          <a:p>
+            <a:endParaRPr lang="en-US" dirty="0"/>
+          </a:p>
+        </p:txBody>
+      </p:sp>
+      <p:sp>
+        <p:nvSpPr>
+          <p:cNvPr id="4" name="Footer Placeholder 3"/>
+          <p:cNvSpPr>
+            <a:spLocks noGrp="1"/>
+          </p:cNvSpPr>
+          <p:nvPr>
+            <p:ph type="ftr" sz="quarter" idx="11"/>
+          </p:nvPr>
+        </p:nvSpPr>
+        <p:spPr/>
+        <p:txBody>
+          <a:bodyPr/>
+          <a:lstStyle/>
+          <a:p>
+            <a:r>
+              <a:rPr lang="en-US" smtClean="0"/>
+              <a:t>Joint Yang Session, IETF 98 - Chicago</a:t>
+            </a:r>
+            <a:endParaRPr lang="en-US" dirty="0"/>
+          </a:p>
+        </p:txBody>
+      </p:sp>
+      <p:sp>
+        <p:nvSpPr>
+          <p:cNvPr id="5" name="Slide Number Placeholder 4"/>
+          <p:cNvSpPr>
+            <a:spLocks noGrp="1"/>
+          </p:cNvSpPr>
+          <p:nvPr>
+            <p:ph type="sldNum" sz="quarter" idx="12"/>
+          </p:nvPr>
+        </p:nvSpPr>
+        <p:spPr/>
+        <p:txBody>
+          <a:bodyPr/>
+          <a:lstStyle/>
+          <a:p>
+            <a:fld id="{4FAB73BC-B049-4115-A692-8D63A059BFB8}" type="slidenum">
+              <a:rPr lang="en-US" smtClean="0"/>
+              <a:t>7</a:t>
+            </a:fld>
+            <a:endParaRPr lang="en-US" dirty="0"/>
+          </a:p>
+        </p:txBody>
+      </p:sp>
+    </p:spTree>
+    <p:extLst>
+      <p:ext uri="{BB962C8B-B14F-4D97-AF65-F5344CB8AC3E}">
+        <p14:creationId xmlns:p14="http://schemas.microsoft.com/office/powerpoint/2010/main" val="3310372066"/>
+      </p:ext>
+    </p:extLst>
+  </p:cSld>
+  <p:clrMapOvr>
+    <a:masterClrMapping/>
+  </p:clrMapOvr>
+</p:sld>
+</file>
+
+<file path=ppt/slides/slide8.xml><?xml version="1.0" encoding="utf-8"?>
+<p:sld xmlns:a="http://schemas.openxmlformats.org/drawingml/2006/main" xmlns:r="http://schemas.openxmlformats.org/officeDocument/2006/relationships" xmlns:p="http://schemas.openxmlformats.org/presentationml/2006/main">
+  <p:cSld>
+    <p:spTree>
+      <p:nvGrpSpPr>
+        <p:cNvPr id="1" name=""/>
+        <p:cNvGrpSpPr/>
+        <p:nvPr/>
+      </p:nvGrpSpPr>
+      <p:grpSpPr>
+        <a:xfrm>
+          <a:off x="0" y="0"/>
+          <a:ext cx="0" cy="0"/>
+          <a:chOff x="0" y="0"/>
+          <a:chExt cx="0" cy="0"/>
+        </a:xfrm>
+      </p:grpSpPr>
+      <p:sp>
+        <p:nvSpPr>
+          <p:cNvPr id="2" name="Rectangle 1"/>
+          <p:cNvSpPr/>
+          <p:nvPr/>
+        </p:nvSpPr>
+        <p:spPr>
+          <a:xfrm>
+            <a:off x="4440932" y="2967335"/>
+            <a:ext cx="3310138" cy="923330"/>
           </a:xfrm>
           <a:prstGeom prst="rect">
             <a:avLst/>
@@ -8758,42 +10127,30 @@
           <a:p>
             <a:pPr algn="ctr"/>
             <a:r>
-              <a:rPr lang="en-US" sz="5400" b="1" dirty="0" smtClean="0">
-                <a:ln w="10160">
-                  <a:solidFill>
-                    <a:schemeClr val="accent5"/>
-                  </a:solidFill>
-                  <a:prstDash val="solid"/>
-                </a:ln>
+              <a:rPr lang="en-US" sz="5400" b="0" cap="none" spc="0" dirty="0" smtClean="0">
+                <a:ln w="0"/>
                 <a:solidFill>
-                  <a:srgbClr val="FFFFFF"/>
+                  <a:schemeClr val="accent1">
+                    <a:lumMod val="20000"/>
+                    <a:lumOff val="80000"/>
+                  </a:schemeClr>
                 </a:solidFill>
                 <a:effectLst>
-                  <a:outerShdw blurRad="38100" dist="22860" dir="5400000" algn="tl" rotWithShape="0">
-                    <a:srgbClr val="000000">
-                      <a:alpha val="30000"/>
-                    </a:srgbClr>
-                  </a:outerShdw>
+                  <a:reflection blurRad="6350" stA="53000" endA="300" endPos="35500" dir="5400000" sy="-90000" algn="bl" rotWithShape="0"/>
                 </a:effectLst>
               </a:rPr>
               <a:t>Thank You!</a:t>
             </a:r>
-            <a:endParaRPr lang="en-US" sz="5400" b="1" dirty="0">
-              <a:ln w="10160">
-                <a:solidFill>
-                  <a:schemeClr val="accent5"/>
-                </a:solidFill>
-                <a:prstDash val="solid"/>
-              </a:ln>
+            <a:endParaRPr lang="en-US" sz="5400" b="0" cap="none" spc="0" dirty="0">
+              <a:ln w="0"/>
               <a:solidFill>
-                <a:srgbClr val="FFFFFF"/>
+                <a:schemeClr val="accent1">
+                  <a:lumMod val="20000"/>
+                  <a:lumOff val="80000"/>
+                </a:schemeClr>
               </a:solidFill>
               <a:effectLst>
-                <a:outerShdw blurRad="38100" dist="22860" dir="5400000" algn="tl" rotWithShape="0">
-                  <a:srgbClr val="000000">
-                    <a:alpha val="30000"/>
-                  </a:srgbClr>
-                </a:outerShdw>
+                <a:reflection blurRad="6350" stA="53000" endA="300" endPos="35500" dir="5400000" sy="-90000" algn="bl" rotWithShape="0"/>
               </a:effectLst>
             </a:endParaRPr>
           </a:p>

</xml_diff>